<commit_message>
update PPT with correct link to Colab
</commit_message>
<xml_diff>
--- a/PPT/Google Colab + Hugging Face：帶你快速認識NLP.pptx
+++ b/PPT/Google Colab + Hugging Face：帶你快速認識NLP.pptx
@@ -5461,7 +5461,17 @@
             </a:r>
             <a:r>
               <a:rPr lang="zh-TW" altLang="en-US" dirty="0"/>
-              <a:t>。之後拿這個</a:t>
+              <a:t>。</a:t>
+            </a:r>
+            <a:endParaRPr lang="en-US" altLang="zh-TW" dirty="0"/>
+          </a:p>
+          <a:p>
+            <a:pPr marL="0" indent="0">
+              <a:buNone/>
+            </a:pPr>
+            <a:r>
+              <a:rPr lang="zh-TW" altLang="en-US" dirty="0"/>
+              <a:t>之後拿這個</a:t>
             </a:r>
             <a:r>
               <a:rPr lang="en-US" altLang="zh-TW" dirty="0"/>
@@ -10316,7 +10326,7 @@
             </a:r>
             <a:r>
               <a:rPr lang="zh-TW" altLang="en-US" dirty="0"/>
-              <a:t>萬的</a:t>
+              <a:t>萬個</a:t>
             </a:r>
             <a:r>
               <a:rPr lang="en-US" altLang="zh-TW" dirty="0"/>
@@ -11519,7 +11529,7 @@
             </a:r>
             <a:r>
               <a:rPr lang="zh-TW" altLang="en-US" dirty="0"/>
-              <a:t>的實際應用、語言預訓練以及</a:t>
+              <a:t>的實際應用、語言預訓練模型以及 </a:t>
             </a:r>
             <a:r>
               <a:rPr lang="en-US" altLang="zh-TW" dirty="0">
@@ -13549,7 +13559,7 @@
             </a:r>
             <a:r>
               <a:rPr lang="zh-TW" altLang="en-US" dirty="0"/>
-              <a:t>：什麼</a:t>
+              <a:t>：什麼是</a:t>
             </a:r>
             <a:r>
               <a:rPr lang="zh-TW" altLang="en-US" b="1" dirty="0">

</xml_diff>

<commit_message>
update ppt lastest time
</commit_message>
<xml_diff>
--- a/PPT/Google Colab + Hugging Face：帶你快速認識NLP.pptx
+++ b/PPT/Google Colab + Hugging Face：帶你快速認識NLP.pptx
@@ -245,7 +245,7 @@
           <a:p>
             <a:fld id="{58BD3B6D-82E5-462B-A470-E078A45A2F5A}" type="datetimeFigureOut">
               <a:rPr lang="zh-TW" altLang="en-US" smtClean="0"/>
-              <a:t>2022/7/27</a:t>
+              <a:t>2022/7/30</a:t>
             </a:fld>
             <a:endParaRPr lang="zh-TW" altLang="en-US"/>
           </a:p>
@@ -423,7 +423,7 @@
           <a:p>
             <a:fld id="{CC91C58A-DD44-4B24-A1EE-0A9806444CC2}" type="datetimeFigureOut">
               <a:rPr lang="zh-TW" altLang="en-US" smtClean="0"/>
-              <a:t>2022/7/27</a:t>
+              <a:t>2022/7/30</a:t>
             </a:fld>
             <a:endParaRPr lang="zh-TW" altLang="en-US"/>
           </a:p>
@@ -822,7 +822,7 @@
           <a:p>
             <a:fld id="{E27967F5-7BBF-4175-B219-22B049360A41}" type="datetime1">
               <a:rPr lang="zh-TW" altLang="en-US" smtClean="0"/>
-              <a:t>2022/7/27</a:t>
+              <a:t>2022/7/30</a:t>
             </a:fld>
             <a:endParaRPr lang="zh-TW" altLang="en-US"/>
           </a:p>
@@ -1008,7 +1008,7 @@
           <a:p>
             <a:fld id="{C176181A-29F7-4D99-B11C-CD0C8012E2C9}" type="datetime1">
               <a:rPr lang="zh-TW" altLang="en-US" smtClean="0"/>
-              <a:t>2022/7/27</a:t>
+              <a:t>2022/7/30</a:t>
             </a:fld>
             <a:endParaRPr lang="zh-TW" altLang="en-US"/>
           </a:p>
@@ -1204,7 +1204,7 @@
           <a:p>
             <a:fld id="{7C7BC0FF-D98C-4429-994A-F5F6B1B41AF9}" type="datetime1">
               <a:rPr lang="zh-TW" altLang="en-US" smtClean="0"/>
-              <a:t>2022/7/27</a:t>
+              <a:t>2022/7/30</a:t>
             </a:fld>
             <a:endParaRPr lang="zh-TW" altLang="en-US"/>
           </a:p>
@@ -1390,7 +1390,7 @@
           <a:p>
             <a:fld id="{A7C0465B-F707-4FF9-93FC-5013A11EDFF6}" type="datetime1">
               <a:rPr lang="zh-TW" altLang="en-US" smtClean="0"/>
-              <a:t>2022/7/27</a:t>
+              <a:t>2022/7/30</a:t>
             </a:fld>
             <a:endParaRPr lang="zh-TW" altLang="en-US"/>
           </a:p>
@@ -1650,7 +1650,7 @@
           <a:p>
             <a:fld id="{299DF96F-CCD9-4D9A-8B54-5C8B08D7D26C}" type="datetime1">
               <a:rPr lang="zh-TW" altLang="en-US" smtClean="0"/>
-              <a:t>2022/7/27</a:t>
+              <a:t>2022/7/30</a:t>
             </a:fld>
             <a:endParaRPr lang="zh-TW" altLang="en-US"/>
           </a:p>
@@ -1898,7 +1898,7 @@
           <a:p>
             <a:fld id="{0FA1BFCA-F9D7-44A9-BC42-8BC9D83D9D95}" type="datetime1">
               <a:rPr lang="zh-TW" altLang="en-US" smtClean="0"/>
-              <a:t>2022/7/27</a:t>
+              <a:t>2022/7/30</a:t>
             </a:fld>
             <a:endParaRPr lang="zh-TW" altLang="en-US"/>
           </a:p>
@@ -2281,7 +2281,7 @@
           <a:p>
             <a:fld id="{7191AC7F-8C29-41A8-B45A-B43D5C846CF7}" type="datetime1">
               <a:rPr lang="zh-TW" altLang="en-US" smtClean="0"/>
-              <a:t>2022/7/27</a:t>
+              <a:t>2022/7/30</a:t>
             </a:fld>
             <a:endParaRPr lang="zh-TW" altLang="en-US"/>
           </a:p>
@@ -2415,7 +2415,7 @@
           <a:p>
             <a:fld id="{86F6DF17-6482-47DE-AFC3-D82FE6203EAC}" type="datetime1">
               <a:rPr lang="zh-TW" altLang="en-US" smtClean="0"/>
-              <a:t>2022/7/27</a:t>
+              <a:t>2022/7/30</a:t>
             </a:fld>
             <a:endParaRPr lang="zh-TW" altLang="en-US"/>
           </a:p>
@@ -2526,7 +2526,7 @@
           <a:p>
             <a:fld id="{1CB7F96A-C6CF-4821-8D0A-CB1437E45C49}" type="datetime1">
               <a:rPr lang="zh-TW" altLang="en-US" smtClean="0"/>
-              <a:t>2022/7/27</a:t>
+              <a:t>2022/7/30</a:t>
             </a:fld>
             <a:endParaRPr lang="zh-TW" altLang="en-US"/>
           </a:p>
@@ -2819,7 +2819,7 @@
           <a:p>
             <a:fld id="{C2E0D487-1DD5-4CEB-AFA0-C21F8CD9EDDE}" type="datetime1">
               <a:rPr lang="zh-TW" altLang="en-US" smtClean="0"/>
-              <a:t>2022/7/27</a:t>
+              <a:t>2022/7/30</a:t>
             </a:fld>
             <a:endParaRPr lang="zh-TW" altLang="en-US"/>
           </a:p>
@@ -3092,7 +3092,7 @@
           <a:p>
             <a:fld id="{7B15480C-51C4-4420-89BB-0DDFE3293154}" type="datetime1">
               <a:rPr lang="zh-TW" altLang="en-US" smtClean="0"/>
-              <a:t>2022/7/27</a:t>
+              <a:t>2022/7/30</a:t>
             </a:fld>
             <a:endParaRPr lang="zh-TW" altLang="en-US"/>
           </a:p>
@@ -3321,7 +3321,7 @@
           <a:p>
             <a:fld id="{ED4C5D1F-CEE8-4F49-A7C9-70CFA44106A1}" type="datetime1">
               <a:rPr lang="zh-TW" altLang="en-US" smtClean="0"/>
-              <a:t>2022/7/27</a:t>
+              <a:t>2022/7/30</a:t>
             </a:fld>
             <a:endParaRPr lang="zh-TW" altLang="en-US"/>
           </a:p>
@@ -5157,19 +5157,19 @@
               <a:buNone/>
             </a:pPr>
             <a:r>
-              <a:rPr lang="en-US" altLang="zh-TW" dirty="0"/>
+              <a:rPr lang="en-US" altLang="zh-TW" b="1" dirty="0"/>
               <a:t>2018</a:t>
             </a:r>
             <a:r>
-              <a:rPr lang="zh-TW" altLang="en-US" dirty="0"/>
+              <a:rPr lang="zh-TW" altLang="en-US" b="1" dirty="0"/>
               <a:t>年</a:t>
             </a:r>
             <a:r>
-              <a:rPr lang="en-US" altLang="zh-TW" dirty="0"/>
+              <a:rPr lang="en-US" altLang="zh-TW" b="1" dirty="0"/>
               <a:t>Google</a:t>
             </a:r>
             <a:r>
-              <a:rPr lang="zh-TW" altLang="en-US" dirty="0"/>
+              <a:rPr lang="zh-TW" altLang="en-US" b="1" dirty="0"/>
               <a:t>提出</a:t>
             </a:r>
             <a:r>
@@ -5687,7 +5687,11 @@
             </a:r>
             <a:r>
               <a:rPr lang="zh-TW" altLang="en-US" dirty="0"/>
-              <a:t>。如果此時再叫我們去學特定的任務 </a:t>
+              <a:t>。如果此時再叫我們去學</a:t>
+            </a:r>
+            <a:r>
+              <a:rPr lang="zh-TW" altLang="en-US" b="1" dirty="0"/>
+              <a:t>特定的任務 </a:t>
             </a:r>
             <a:r>
               <a:rPr lang="en-US" altLang="zh-TW" dirty="0"/>

</xml_diff>